<commit_message>
documentation updated as per .gif added
</commit_message>
<xml_diff>
--- a/docs/ppt/sessions/1/AutoPlot_session_1.pptx
+++ b/docs/ppt/sessions/1/AutoPlot_session_1.pptx
@@ -269,7 +269,7 @@
             <a:fld id="{672E1A00-EE2E-4C0F-AC6B-9431477BA8CA}" type="datetimeFigureOut">
               <a:rPr lang="en-US" smtClean="0"/>
               <a:pPr/>
-              <a:t>23-Nov-19</a:t>
+              <a:t>11-Dec-19</a:t>
             </a:fld>
             <a:endParaRPr lang="en-US"/>
           </a:p>
@@ -439,7 +439,7 @@
             <a:fld id="{672E1A00-EE2E-4C0F-AC6B-9431477BA8CA}" type="datetimeFigureOut">
               <a:rPr lang="en-US" smtClean="0"/>
               <a:pPr/>
-              <a:t>23-Nov-19</a:t>
+              <a:t>11-Dec-19</a:t>
             </a:fld>
             <a:endParaRPr lang="en-US"/>
           </a:p>
@@ -619,7 +619,7 @@
             <a:fld id="{672E1A00-EE2E-4C0F-AC6B-9431477BA8CA}" type="datetimeFigureOut">
               <a:rPr lang="en-US" smtClean="0"/>
               <a:pPr/>
-              <a:t>23-Nov-19</a:t>
+              <a:t>11-Dec-19</a:t>
             </a:fld>
             <a:endParaRPr lang="en-US"/>
           </a:p>
@@ -789,7 +789,7 @@
             <a:fld id="{672E1A00-EE2E-4C0F-AC6B-9431477BA8CA}" type="datetimeFigureOut">
               <a:rPr lang="en-US" smtClean="0"/>
               <a:pPr/>
-              <a:t>23-Nov-19</a:t>
+              <a:t>11-Dec-19</a:t>
             </a:fld>
             <a:endParaRPr lang="en-US"/>
           </a:p>
@@ -1036,7 +1036,7 @@
             <a:fld id="{672E1A00-EE2E-4C0F-AC6B-9431477BA8CA}" type="datetimeFigureOut">
               <a:rPr lang="en-US" smtClean="0"/>
               <a:pPr/>
-              <a:t>23-Nov-19</a:t>
+              <a:t>11-Dec-19</a:t>
             </a:fld>
             <a:endParaRPr lang="en-US"/>
           </a:p>
@@ -1267,7 +1267,7 @@
             <a:fld id="{672E1A00-EE2E-4C0F-AC6B-9431477BA8CA}" type="datetimeFigureOut">
               <a:rPr lang="en-US" smtClean="0"/>
               <a:pPr/>
-              <a:t>23-Nov-19</a:t>
+              <a:t>11-Dec-19</a:t>
             </a:fld>
             <a:endParaRPr lang="en-US"/>
           </a:p>
@@ -1633,7 +1633,7 @@
             <a:fld id="{672E1A00-EE2E-4C0F-AC6B-9431477BA8CA}" type="datetimeFigureOut">
               <a:rPr lang="en-US" smtClean="0"/>
               <a:pPr/>
-              <a:t>23-Nov-19</a:t>
+              <a:t>11-Dec-19</a:t>
             </a:fld>
             <a:endParaRPr lang="en-US"/>
           </a:p>
@@ -1752,7 +1752,7 @@
             <a:fld id="{672E1A00-EE2E-4C0F-AC6B-9431477BA8CA}" type="datetimeFigureOut">
               <a:rPr lang="en-US" smtClean="0"/>
               <a:pPr/>
-              <a:t>23-Nov-19</a:t>
+              <a:t>11-Dec-19</a:t>
             </a:fld>
             <a:endParaRPr lang="en-US"/>
           </a:p>
@@ -1849,7 +1849,7 @@
             <a:fld id="{672E1A00-EE2E-4C0F-AC6B-9431477BA8CA}" type="datetimeFigureOut">
               <a:rPr lang="en-US" smtClean="0"/>
               <a:pPr/>
-              <a:t>23-Nov-19</a:t>
+              <a:t>11-Dec-19</a:t>
             </a:fld>
             <a:endParaRPr lang="en-US"/>
           </a:p>
@@ -2126,7 +2126,7 @@
             <a:fld id="{672E1A00-EE2E-4C0F-AC6B-9431477BA8CA}" type="datetimeFigureOut">
               <a:rPr lang="en-US" smtClean="0"/>
               <a:pPr/>
-              <a:t>23-Nov-19</a:t>
+              <a:t>11-Dec-19</a:t>
             </a:fld>
             <a:endParaRPr lang="en-US"/>
           </a:p>
@@ -2380,7 +2380,7 @@
             <a:fld id="{672E1A00-EE2E-4C0F-AC6B-9431477BA8CA}" type="datetimeFigureOut">
               <a:rPr lang="en-US" smtClean="0"/>
               <a:pPr/>
-              <a:t>23-Nov-19</a:t>
+              <a:t>11-Dec-19</a:t>
             </a:fld>
             <a:endParaRPr lang="en-US"/>
           </a:p>
@@ -2603,7 +2603,7 @@
             <a:fld id="{672E1A00-EE2E-4C0F-AC6B-9431477BA8CA}" type="datetimeFigureOut">
               <a:rPr lang="en-US" smtClean="0"/>
               <a:pPr/>
-              <a:t>23-Nov-19</a:t>
+              <a:t>11-Dec-19</a:t>
             </a:fld>
             <a:endParaRPr lang="en-US"/>
           </a:p>
@@ -3085,7 +3085,7 @@
                   </a:schemeClr>
                 </a:solidFill>
               </a:rPr>
-              <a:t>Visualize Data</a:t>
+              <a:t>Data Visualization Tool</a:t>
             </a:r>
           </a:p>
         </p:txBody>

</xml_diff>